<commit_message>
Fixes formatting and a quote that was not entered
Signed-off-by: Franklin Webber <franklin@chef.io>
</commit_message>
<xml_diff>
--- a/05-def_method.pptx
+++ b/05-def_method.pptx
@@ -831,7 +831,15 @@
             </a:r>
             <a:r>
               <a:rPr lang="en-US" dirty="0" smtClean="0"/>
-              <a:t>we are going to explore is defining Ruby methods</a:t>
+              <a:t>we are going to explore is defining </a:t>
+            </a:r>
+            <a:r>
+              <a:rPr lang="en-US" smtClean="0"/>
+              <a:t>Ruby </a:t>
+            </a:r>
+            <a:r>
+              <a:rPr lang="en-US" smtClean="0"/>
+              <a:t>methods.</a:t>
             </a:r>
             <a:endParaRPr lang="en-US" dirty="0"/>
           </a:p>
@@ -2242,11 +2250,23 @@
           <a:p>
             <a:r>
               <a:rPr lang="en-US" dirty="0"/>
-              <a:t>Now it is time to demonstrate how let can be used to help create more </a:t>
+              <a:t>Now it is time to demonstrate how </a:t>
             </a:r>
             <a:r>
               <a:rPr lang="en-US" dirty="0" smtClean="0"/>
-              <a:t>elegance within your example groups using methods.</a:t>
+              <a:t>defining a method can </a:t>
+            </a:r>
+            <a:r>
+              <a:rPr lang="en-US" dirty="0"/>
+              <a:t>be used to help create more </a:t>
+            </a:r>
+            <a:r>
+              <a:rPr lang="en-US" dirty="0" smtClean="0"/>
+              <a:t>elegance within </a:t>
+            </a:r>
+            <a:r>
+              <a:rPr lang="en-US" dirty="0" smtClean="0"/>
+              <a:t>each example.</a:t>
             </a:r>
             <a:endParaRPr lang="en-US" dirty="0"/>
           </a:p>
@@ -3527,14 +3547,14 @@
           </a:ln>
           <a:extLst>
             <a:ext uri="{909E8E84-426E-40dd-AFC4-6F175D3DCCD1}">
-              <a14:hiddenFill xmlns:a14="http://schemas.microsoft.com/office/drawing/2010/main" xmlns="">
+              <a14:hiddenFill xmlns="" xmlns:a14="http://schemas.microsoft.com/office/drawing/2010/main">
                 <a:solidFill>
                   <a:srgbClr val="FFFFFF"/>
                 </a:solidFill>
               </a14:hiddenFill>
             </a:ext>
             <a:ext uri="{91240B29-F687-4f45-9708-019B960494DF}">
-              <a14:hiddenLine xmlns:a14="http://schemas.microsoft.com/office/drawing/2010/main" xmlns="" w="9525">
+              <a14:hiddenLine xmlns="" xmlns:a14="http://schemas.microsoft.com/office/drawing/2010/main" w="9525">
                 <a:solidFill>
                   <a:srgbClr val="000000"/>
                 </a:solidFill>
@@ -3682,14 +3702,14 @@
           </a:ln>
           <a:extLst>
             <a:ext uri="{909E8E84-426E-40dd-AFC4-6F175D3DCCD1}">
-              <a14:hiddenFill xmlns:a14="http://schemas.microsoft.com/office/drawing/2010/main" xmlns="">
+              <a14:hiddenFill xmlns="" xmlns:a14="http://schemas.microsoft.com/office/drawing/2010/main">
                 <a:solidFill>
                   <a:srgbClr val="FFFFFF"/>
                 </a:solidFill>
               </a14:hiddenFill>
             </a:ext>
             <a:ext uri="{91240B29-F687-4f45-9708-019B960494DF}">
-              <a14:hiddenLine xmlns:a14="http://schemas.microsoft.com/office/drawing/2010/main" xmlns="" w="9525">
+              <a14:hiddenLine xmlns="" xmlns:a14="http://schemas.microsoft.com/office/drawing/2010/main" w="9525">
                 <a:solidFill>
                   <a:srgbClr val="000000"/>
                 </a:solidFill>
@@ -4180,14 +4200,14 @@
           </a:ln>
           <a:extLst>
             <a:ext uri="{909E8E84-426E-40dd-AFC4-6F175D3DCCD1}">
-              <a14:hiddenFill xmlns:a14="http://schemas.microsoft.com/office/drawing/2010/main" xmlns="">
+              <a14:hiddenFill xmlns="" xmlns:a14="http://schemas.microsoft.com/office/drawing/2010/main">
                 <a:solidFill>
                   <a:srgbClr val="FFFFFF"/>
                 </a:solidFill>
               </a14:hiddenFill>
             </a:ext>
             <a:ext uri="{91240B29-F687-4f45-9708-019B960494DF}">
-              <a14:hiddenLine xmlns:a14="http://schemas.microsoft.com/office/drawing/2010/main" xmlns="" w="9525">
+              <a14:hiddenLine xmlns="" xmlns:a14="http://schemas.microsoft.com/office/drawing/2010/main" w="9525">
                 <a:solidFill>
                   <a:srgbClr val="000000"/>
                 </a:solidFill>
@@ -6493,14 +6513,14 @@
           </a:ln>
           <a:extLst>
             <a:ext uri="{909E8E84-426E-40dd-AFC4-6F175D3DCCD1}">
-              <a14:hiddenFill xmlns:a14="http://schemas.microsoft.com/office/drawing/2010/main" xmlns="">
+              <a14:hiddenFill xmlns="" xmlns:a14="http://schemas.microsoft.com/office/drawing/2010/main">
                 <a:solidFill>
                   <a:srgbClr val="FFFFFF"/>
                 </a:solidFill>
               </a14:hiddenFill>
             </a:ext>
             <a:ext uri="{91240B29-F687-4f45-9708-019B960494DF}">
-              <a14:hiddenLine xmlns:a14="http://schemas.microsoft.com/office/drawing/2010/main" xmlns="" w="9525">
+              <a14:hiddenLine xmlns="" xmlns:a14="http://schemas.microsoft.com/office/drawing/2010/main" w="9525">
                 <a:solidFill>
                   <a:srgbClr val="000000"/>
                 </a:solidFill>
@@ -7871,14 +7891,14 @@
           </a:ln>
           <a:extLst>
             <a:ext uri="{909E8E84-426E-40dd-AFC4-6F175D3DCCD1}">
-              <a14:hiddenFill xmlns:a14="http://schemas.microsoft.com/office/drawing/2010/main" xmlns="">
+              <a14:hiddenFill xmlns="" xmlns:a14="http://schemas.microsoft.com/office/drawing/2010/main">
                 <a:solidFill>
                   <a:srgbClr val="FFFFFF"/>
                 </a:solidFill>
               </a14:hiddenFill>
             </a:ext>
             <a:ext uri="{91240B29-F687-4f45-9708-019B960494DF}">
-              <a14:hiddenLine xmlns:a14="http://schemas.microsoft.com/office/drawing/2010/main" xmlns="" w="9525">
+              <a14:hiddenLine xmlns="" xmlns:a14="http://schemas.microsoft.com/office/drawing/2010/main" w="9525">
                 <a:solidFill>
                   <a:srgbClr val="000000"/>
                 </a:solidFill>
@@ -8436,14 +8456,14 @@
           </a:ln>
           <a:extLst>
             <a:ext uri="{909E8E84-426E-40dd-AFC4-6F175D3DCCD1}">
-              <a14:hiddenFill xmlns:a14="http://schemas.microsoft.com/office/drawing/2010/main" xmlns="">
+              <a14:hiddenFill xmlns="" xmlns:a14="http://schemas.microsoft.com/office/drawing/2010/main">
                 <a:solidFill>
                   <a:srgbClr val="FFFFFF"/>
                 </a:solidFill>
               </a14:hiddenFill>
             </a:ext>
             <a:ext uri="{91240B29-F687-4f45-9708-019B960494DF}">
-              <a14:hiddenLine xmlns:a14="http://schemas.microsoft.com/office/drawing/2010/main" xmlns="" w="9525">
+              <a14:hiddenLine xmlns="" xmlns:a14="http://schemas.microsoft.com/office/drawing/2010/main" w="9525">
                 <a:solidFill>
                   <a:srgbClr val="000000"/>
                 </a:solidFill>
@@ -9010,14 +9030,14 @@
           </a:ln>
           <a:extLst>
             <a:ext uri="{909E8E84-426E-40dd-AFC4-6F175D3DCCD1}">
-              <a14:hiddenFill xmlns:a14="http://schemas.microsoft.com/office/drawing/2010/main" xmlns="">
+              <a14:hiddenFill xmlns="" xmlns:a14="http://schemas.microsoft.com/office/drawing/2010/main">
                 <a:solidFill>
                   <a:srgbClr val="FFFFFF"/>
                 </a:solidFill>
               </a14:hiddenFill>
             </a:ext>
             <a:ext uri="{91240B29-F687-4f45-9708-019B960494DF}">
-              <a14:hiddenLine xmlns:a14="http://schemas.microsoft.com/office/drawing/2010/main" xmlns="" w="9525">
+              <a14:hiddenLine xmlns="" xmlns:a14="http://schemas.microsoft.com/office/drawing/2010/main" w="9525">
                 <a:solidFill>
                   <a:srgbClr val="000000"/>
                 </a:solidFill>
@@ -9669,14 +9689,14 @@
           </a:ln>
           <a:extLst>
             <a:ext uri="{909E8E84-426E-40dd-AFC4-6F175D3DCCD1}">
-              <a14:hiddenFill xmlns:a14="http://schemas.microsoft.com/office/drawing/2010/main" xmlns="">
+              <a14:hiddenFill xmlns="" xmlns:a14="http://schemas.microsoft.com/office/drawing/2010/main">
                 <a:solidFill>
                   <a:srgbClr val="FFFFFF"/>
                 </a:solidFill>
               </a14:hiddenFill>
             </a:ext>
             <a:ext uri="{91240B29-F687-4f45-9708-019B960494DF}">
-              <a14:hiddenLine xmlns:a14="http://schemas.microsoft.com/office/drawing/2010/main" xmlns="" w="9525">
+              <a14:hiddenLine xmlns="" xmlns:a14="http://schemas.microsoft.com/office/drawing/2010/main" w="9525">
                 <a:solidFill>
                   <a:srgbClr val="000000"/>
                 </a:solidFill>
@@ -10463,14 +10483,14 @@
           </a:ln>
           <a:extLst>
             <a:ext uri="{909E8E84-426E-40dd-AFC4-6F175D3DCCD1}">
-              <a14:hiddenFill xmlns:a14="http://schemas.microsoft.com/office/drawing/2010/main" xmlns="">
+              <a14:hiddenFill xmlns="" xmlns:a14="http://schemas.microsoft.com/office/drawing/2010/main">
                 <a:solidFill>
                   <a:srgbClr val="FFFFFF"/>
                 </a:solidFill>
               </a14:hiddenFill>
             </a:ext>
             <a:ext uri="{91240B29-F687-4f45-9708-019B960494DF}">
-              <a14:hiddenLine xmlns:a14="http://schemas.microsoft.com/office/drawing/2010/main" xmlns="" w="9525">
+              <a14:hiddenLine xmlns="" xmlns:a14="http://schemas.microsoft.com/office/drawing/2010/main" w="9525">
                 <a:solidFill>
                   <a:srgbClr val="000000"/>
                 </a:solidFill>
@@ -11369,14 +11389,14 @@
           </a:ln>
           <a:extLst>
             <a:ext uri="{909E8E84-426E-40dd-AFC4-6F175D3DCCD1}">
-              <a14:hiddenFill xmlns:a14="http://schemas.microsoft.com/office/drawing/2010/main" xmlns="">
+              <a14:hiddenFill xmlns="" xmlns:a14="http://schemas.microsoft.com/office/drawing/2010/main">
                 <a:solidFill>
                   <a:srgbClr val="FFFFFF"/>
                 </a:solidFill>
               </a14:hiddenFill>
             </a:ext>
             <a:ext uri="{91240B29-F687-4f45-9708-019B960494DF}">
-              <a14:hiddenLine xmlns:a14="http://schemas.microsoft.com/office/drawing/2010/main" xmlns="" w="9525">
+              <a14:hiddenLine xmlns="" xmlns:a14="http://schemas.microsoft.com/office/drawing/2010/main" w="9525">
                 <a:solidFill>
                   <a:srgbClr val="000000"/>
                 </a:solidFill>

</xml_diff>